<commit_message>
modified architecture (added DNS private zone)
</commit_message>
<xml_diff>
--- a/docs/images/fig.pptx
+++ b/docs/images/fig.pptx
@@ -23302,6 +23302,84 @@
           </a:p>
         </p:txBody>
       </p:sp>
+      <p:pic>
+        <p:nvPicPr>
+          <p:cNvPr id="1025" name="グラフィックス 1024">
+            <a:extLst>
+              <a:ext uri="{FF2B5EF4-FFF2-40B4-BE49-F238E27FC236}">
+                <a16:creationId xmlns:a16="http://schemas.microsoft.com/office/drawing/2014/main" id="{810C0AE7-C111-7ECD-B8A6-98D6A7DD6C9E}"/>
+              </a:ext>
+            </a:extLst>
+          </p:cNvPr>
+          <p:cNvPicPr>
+            <a:picLocks noChangeAspect="1"/>
+          </p:cNvPicPr>
+          <p:nvPr/>
+        </p:nvPicPr>
+        <p:blipFill>
+          <a:blip r:embed="rId32">
+            <a:extLst>
+              <a:ext uri="{28A0092B-C50C-407E-A947-70E740481C1C}">
+                <a14:useLocalDpi xmlns:a14="http://schemas.microsoft.com/office/drawing/2010/main" val="0"/>
+              </a:ext>
+              <a:ext uri="{96DAC541-7B7A-43D3-8B79-37D633B846F1}">
+                <asvg:svgBlip xmlns:asvg="http://schemas.microsoft.com/office/drawing/2016/SVG/main" r:embed="rId33"/>
+              </a:ext>
+            </a:extLst>
+          </a:blip>
+          <a:stretch>
+            <a:fillRect/>
+          </a:stretch>
+        </p:blipFill>
+        <p:spPr>
+          <a:xfrm>
+            <a:off x="8379647" y="1858257"/>
+            <a:ext cx="129067" cy="129067"/>
+          </a:xfrm>
+          <a:prstGeom prst="rect">
+            <a:avLst/>
+          </a:prstGeom>
+        </p:spPr>
+      </p:pic>
+      <p:pic>
+        <p:nvPicPr>
+          <p:cNvPr id="1035" name="グラフィックス 1034">
+            <a:extLst>
+              <a:ext uri="{FF2B5EF4-FFF2-40B4-BE49-F238E27FC236}">
+                <a16:creationId xmlns:a16="http://schemas.microsoft.com/office/drawing/2014/main" id="{1DD2A3D3-5C4F-52C9-41F5-1239C18F1A83}"/>
+              </a:ext>
+            </a:extLst>
+          </p:cNvPr>
+          <p:cNvPicPr>
+            <a:picLocks noChangeAspect="1"/>
+          </p:cNvPicPr>
+          <p:nvPr/>
+        </p:nvPicPr>
+        <p:blipFill>
+          <a:blip r:embed="rId34">
+            <a:extLst>
+              <a:ext uri="{28A0092B-C50C-407E-A947-70E740481C1C}">
+                <a14:useLocalDpi xmlns:a14="http://schemas.microsoft.com/office/drawing/2010/main" val="0"/>
+              </a:ext>
+              <a:ext uri="{96DAC541-7B7A-43D3-8B79-37D633B846F1}">
+                <asvg:svgBlip xmlns:asvg="http://schemas.microsoft.com/office/drawing/2016/SVG/main" r:embed="rId35"/>
+              </a:ext>
+            </a:extLst>
+          </a:blip>
+          <a:stretch>
+            <a:fillRect/>
+          </a:stretch>
+        </p:blipFill>
+        <p:spPr>
+          <a:xfrm>
+            <a:off x="9057541" y="5553722"/>
+            <a:ext cx="501260" cy="501260"/>
+          </a:xfrm>
+          <a:prstGeom prst="rect">
+            <a:avLst/>
+          </a:prstGeom>
+        </p:spPr>
+      </p:pic>
     </p:spTree>
     <p:extLst>
       <p:ext uri="{BB962C8B-B14F-4D97-AF65-F5344CB8AC3E}">

</xml_diff>